<commit_message>
Einfügen weiterer Abbildungen + Arbeitsdatein, die zur Erstellung nötig waren
</commit_message>
<xml_diff>
--- a/Kapitel3/Kapitel3.pptx
+++ b/Kapitel3/Kapitel3.pptx
@@ -5,7 +5,7 @@
     <p:sldMasterId id="2147483648" r:id="rId1"/>
   </p:sldMasterIdLst>
   <p:notesMasterIdLst>
-    <p:notesMasterId r:id="rId7"/>
+    <p:notesMasterId r:id="rId9"/>
   </p:notesMasterIdLst>
   <p:sldIdLst>
     <p:sldId id="256" r:id="rId2"/>
@@ -13,6 +13,8 @@
     <p:sldId id="258" r:id="rId4"/>
     <p:sldId id="259" r:id="rId5"/>
     <p:sldId id="260" r:id="rId6"/>
+    <p:sldId id="261" r:id="rId7"/>
+    <p:sldId id="262" r:id="rId8"/>
   </p:sldIdLst>
   <p:sldSz cx="12192000" cy="6858000"/>
   <p:notesSz cx="6858000" cy="9144000"/>
@@ -201,7 +203,7 @@
           <a:p>
             <a:fld id="{8D65B378-8A13-4A69-B338-8286273E398E}" type="datetimeFigureOut">
               <a:rPr lang="de-DE" smtClean="0"/>
-              <a:t>15.08.2019</a:t>
+              <a:t>22.08.2019</a:t>
             </a:fld>
             <a:endParaRPr lang="de-DE"/>
           </a:p>
@@ -615,7 +617,7 @@
           <a:p>
             <a:fld id="{854AB9C9-3AB0-42C1-A402-E27FE920F0ED}" type="datetimeFigureOut">
               <a:rPr lang="de-DE" smtClean="0"/>
-              <a:t>15.08.2019</a:t>
+              <a:t>22.08.2019</a:t>
             </a:fld>
             <a:endParaRPr lang="de-DE"/>
           </a:p>
@@ -813,7 +815,7 @@
           <a:p>
             <a:fld id="{854AB9C9-3AB0-42C1-A402-E27FE920F0ED}" type="datetimeFigureOut">
               <a:rPr lang="de-DE" smtClean="0"/>
-              <a:t>15.08.2019</a:t>
+              <a:t>22.08.2019</a:t>
             </a:fld>
             <a:endParaRPr lang="de-DE"/>
           </a:p>
@@ -1021,7 +1023,7 @@
           <a:p>
             <a:fld id="{854AB9C9-3AB0-42C1-A402-E27FE920F0ED}" type="datetimeFigureOut">
               <a:rPr lang="de-DE" smtClean="0"/>
-              <a:t>15.08.2019</a:t>
+              <a:t>22.08.2019</a:t>
             </a:fld>
             <a:endParaRPr lang="de-DE"/>
           </a:p>
@@ -1219,7 +1221,7 @@
           <a:p>
             <a:fld id="{854AB9C9-3AB0-42C1-A402-E27FE920F0ED}" type="datetimeFigureOut">
               <a:rPr lang="de-DE" smtClean="0"/>
-              <a:t>15.08.2019</a:t>
+              <a:t>22.08.2019</a:t>
             </a:fld>
             <a:endParaRPr lang="de-DE"/>
           </a:p>
@@ -1494,7 +1496,7 @@
           <a:p>
             <a:fld id="{854AB9C9-3AB0-42C1-A402-E27FE920F0ED}" type="datetimeFigureOut">
               <a:rPr lang="de-DE" smtClean="0"/>
-              <a:t>15.08.2019</a:t>
+              <a:t>22.08.2019</a:t>
             </a:fld>
             <a:endParaRPr lang="de-DE"/>
           </a:p>
@@ -1759,7 +1761,7 @@
           <a:p>
             <a:fld id="{854AB9C9-3AB0-42C1-A402-E27FE920F0ED}" type="datetimeFigureOut">
               <a:rPr lang="de-DE" smtClean="0"/>
-              <a:t>15.08.2019</a:t>
+              <a:t>22.08.2019</a:t>
             </a:fld>
             <a:endParaRPr lang="de-DE"/>
           </a:p>
@@ -2171,7 +2173,7 @@
           <a:p>
             <a:fld id="{854AB9C9-3AB0-42C1-A402-E27FE920F0ED}" type="datetimeFigureOut">
               <a:rPr lang="de-DE" smtClean="0"/>
-              <a:t>15.08.2019</a:t>
+              <a:t>22.08.2019</a:t>
             </a:fld>
             <a:endParaRPr lang="de-DE"/>
           </a:p>
@@ -2312,7 +2314,7 @@
           <a:p>
             <a:fld id="{854AB9C9-3AB0-42C1-A402-E27FE920F0ED}" type="datetimeFigureOut">
               <a:rPr lang="de-DE" smtClean="0"/>
-              <a:t>15.08.2019</a:t>
+              <a:t>22.08.2019</a:t>
             </a:fld>
             <a:endParaRPr lang="de-DE"/>
           </a:p>
@@ -2425,7 +2427,7 @@
           <a:p>
             <a:fld id="{854AB9C9-3AB0-42C1-A402-E27FE920F0ED}" type="datetimeFigureOut">
               <a:rPr lang="de-DE" smtClean="0"/>
-              <a:t>15.08.2019</a:t>
+              <a:t>22.08.2019</a:t>
             </a:fld>
             <a:endParaRPr lang="de-DE"/>
           </a:p>
@@ -2736,7 +2738,7 @@
           <a:p>
             <a:fld id="{854AB9C9-3AB0-42C1-A402-E27FE920F0ED}" type="datetimeFigureOut">
               <a:rPr lang="de-DE" smtClean="0"/>
-              <a:t>15.08.2019</a:t>
+              <a:t>22.08.2019</a:t>
             </a:fld>
             <a:endParaRPr lang="de-DE"/>
           </a:p>
@@ -3024,7 +3026,7 @@
           <a:p>
             <a:fld id="{854AB9C9-3AB0-42C1-A402-E27FE920F0ED}" type="datetimeFigureOut">
               <a:rPr lang="de-DE" smtClean="0"/>
-              <a:t>15.08.2019</a:t>
+              <a:t>22.08.2019</a:t>
             </a:fld>
             <a:endParaRPr lang="de-DE"/>
           </a:p>
@@ -3265,7 +3267,7 @@
           <a:p>
             <a:fld id="{854AB9C9-3AB0-42C1-A402-E27FE920F0ED}" type="datetimeFigureOut">
               <a:rPr lang="de-DE" smtClean="0"/>
-              <a:t>15.08.2019</a:t>
+              <a:t>22.08.2019</a:t>
             </a:fld>
             <a:endParaRPr lang="de-DE"/>
           </a:p>
@@ -14457,6 +14459,1252 @@
 </p:sld>
 </file>
 
+<file path=ppt/slides/slide6.xml><?xml version="1.0" encoding="utf-8"?>
+<p:sld xmlns:a="http://schemas.openxmlformats.org/drawingml/2006/main" xmlns:r="http://schemas.openxmlformats.org/officeDocument/2006/relationships" xmlns:p="http://schemas.openxmlformats.org/presentationml/2006/main">
+  <p:cSld>
+    <p:spTree>
+      <p:nvGrpSpPr>
+        <p:cNvPr id="1" name=""/>
+        <p:cNvGrpSpPr/>
+        <p:nvPr/>
+      </p:nvGrpSpPr>
+      <p:grpSpPr>
+        <a:xfrm>
+          <a:off x="0" y="0"/>
+          <a:ext cx="0" cy="0"/>
+          <a:chOff x="0" y="0"/>
+          <a:chExt cx="0" cy="0"/>
+        </a:xfrm>
+      </p:grpSpPr>
+      <p:sp>
+        <p:nvSpPr>
+          <p:cNvPr id="2" name="Titel 1">
+            <a:extLst>
+              <a:ext uri="{FF2B5EF4-FFF2-40B4-BE49-F238E27FC236}">
+                <a16:creationId xmlns:a16="http://schemas.microsoft.com/office/drawing/2014/main" id="{784E87C2-2979-4310-A735-0F4CF35D3DFD}"/>
+              </a:ext>
+            </a:extLst>
+          </p:cNvPr>
+          <p:cNvSpPr>
+            <a:spLocks noGrp="1"/>
+          </p:cNvSpPr>
+          <p:nvPr>
+            <p:ph type="title"/>
+          </p:nvPr>
+        </p:nvSpPr>
+        <p:spPr>
+          <a:xfrm>
+            <a:off x="838200" y="365125"/>
+            <a:ext cx="10515600" cy="1325563"/>
+          </a:xfrm>
+        </p:spPr>
+        <p:txBody>
+          <a:bodyPr/>
+          <a:lstStyle/>
+          <a:p>
+            <a:r>
+              <a:rPr lang="de-DE" dirty="0"/>
+              <a:t>Abb3_33</a:t>
+            </a:r>
+          </a:p>
+        </p:txBody>
+      </p:sp>
+      <p:graphicFrame>
+        <p:nvGraphicFramePr>
+          <p:cNvPr id="3" name="Tabelle 2">
+            <a:extLst>
+              <a:ext uri="{FF2B5EF4-FFF2-40B4-BE49-F238E27FC236}">
+                <a16:creationId xmlns:a16="http://schemas.microsoft.com/office/drawing/2014/main" id="{7CC29E49-AB85-4561-8ABC-9707DDED2D80}"/>
+              </a:ext>
+            </a:extLst>
+          </p:cNvPr>
+          <p:cNvGraphicFramePr>
+            <a:graphicFrameLocks noGrp="1"/>
+          </p:cNvGraphicFramePr>
+          <p:nvPr>
+            <p:extLst>
+              <p:ext uri="{D42A27DB-BD31-4B8C-83A1-F6EECF244321}">
+                <p14:modId xmlns:p14="http://schemas.microsoft.com/office/powerpoint/2010/main" val="3553098370"/>
+              </p:ext>
+            </p:extLst>
+          </p:nvPr>
+        </p:nvGraphicFramePr>
+        <p:xfrm>
+          <a:off x="2031999" y="2501900"/>
+          <a:ext cx="5602667" cy="1274400"/>
+        </p:xfrm>
+        <a:graphic>
+          <a:graphicData uri="http://schemas.openxmlformats.org/drawingml/2006/table">
+            <a:tbl>
+              <a:tblPr firstRow="1" bandRow="1">
+                <a:tableStyleId>{5940675A-B579-460E-94D1-54222C63F5DA}</a:tableStyleId>
+              </a:tblPr>
+              <a:tblGrid>
+                <a:gridCol w="1354667">
+                  <a:extLst>
+                    <a:ext uri="{9D8B030D-6E8A-4147-A177-3AD203B41FA5}">
+                      <a16:colId xmlns:a16="http://schemas.microsoft.com/office/drawing/2014/main" val="3225287174"/>
+                    </a:ext>
+                  </a:extLst>
+                </a:gridCol>
+                <a:gridCol w="288000">
+                  <a:extLst>
+                    <a:ext uri="{9D8B030D-6E8A-4147-A177-3AD203B41FA5}">
+                      <a16:colId xmlns:a16="http://schemas.microsoft.com/office/drawing/2014/main" val="3595241694"/>
+                    </a:ext>
+                  </a:extLst>
+                </a:gridCol>
+                <a:gridCol w="1692000">
+                  <a:extLst>
+                    <a:ext uri="{9D8B030D-6E8A-4147-A177-3AD203B41FA5}">
+                      <a16:colId xmlns:a16="http://schemas.microsoft.com/office/drawing/2014/main" val="3131738988"/>
+                    </a:ext>
+                  </a:extLst>
+                </a:gridCol>
+                <a:gridCol w="756000">
+                  <a:extLst>
+                    <a:ext uri="{9D8B030D-6E8A-4147-A177-3AD203B41FA5}">
+                      <a16:colId xmlns:a16="http://schemas.microsoft.com/office/drawing/2014/main" val="2403842369"/>
+                    </a:ext>
+                  </a:extLst>
+                </a:gridCol>
+                <a:gridCol w="756000">
+                  <a:extLst>
+                    <a:ext uri="{9D8B030D-6E8A-4147-A177-3AD203B41FA5}">
+                      <a16:colId xmlns:a16="http://schemas.microsoft.com/office/drawing/2014/main" val="2187467941"/>
+                    </a:ext>
+                  </a:extLst>
+                </a:gridCol>
+                <a:gridCol w="756000">
+                  <a:extLst>
+                    <a:ext uri="{9D8B030D-6E8A-4147-A177-3AD203B41FA5}">
+                      <a16:colId xmlns:a16="http://schemas.microsoft.com/office/drawing/2014/main" val="2515156784"/>
+                    </a:ext>
+                  </a:extLst>
+                </a:gridCol>
+              </a:tblGrid>
+              <a:tr h="0">
+                <a:tc rowSpan="2">
+                  <a:txBody>
+                    <a:bodyPr/>
+                    <a:lstStyle/>
+                    <a:p>
+                      <a:r>
+                        <a:rPr lang="de-DE" sz="1200" dirty="0">
+                          <a:latin typeface="Arial" panose="020B0604020202020204" pitchFamily="34" charset="0"/>
+                          <a:cs typeface="Arial" panose="020B0604020202020204" pitchFamily="34" charset="0"/>
+                        </a:rPr>
+                        <a:t>Konzept der Ringwahrnehmung</a:t>
+                      </a:r>
+                    </a:p>
+                  </a:txBody>
+                  <a:tcPr marL="36000" marR="36000" marT="36000" marB="36000"/>
+                </a:tc>
+                <a:tc gridSpan="2">
+                  <a:txBody>
+                    <a:bodyPr/>
+                    <a:lstStyle/>
+                    <a:p>
+                      <a:r>
+                        <a:rPr lang="de-DE" sz="1200" dirty="0">
+                          <a:latin typeface="Arial" panose="020B0604020202020204" pitchFamily="34" charset="0"/>
+                          <a:cs typeface="Arial" panose="020B0604020202020204" pitchFamily="34" charset="0"/>
+                        </a:rPr>
+                        <a:t>Ringe / ICs</a:t>
+                      </a:r>
+                    </a:p>
+                  </a:txBody>
+                  <a:tcPr marL="36000" marR="36000" marT="36000" marB="36000"/>
+                </a:tc>
+                <a:tc hMerge="1">
+                  <a:txBody>
+                    <a:bodyPr/>
+                    <a:lstStyle/>
+                    <a:p>
+                      <a:endParaRPr lang="de-DE" sz="1200" dirty="0">
+                        <a:latin typeface="Arial" panose="020B0604020202020204" pitchFamily="34" charset="0"/>
+                        <a:cs typeface="Arial" panose="020B0604020202020204" pitchFamily="34" charset="0"/>
+                      </a:endParaRPr>
+                    </a:p>
+                  </a:txBody>
+                  <a:tcPr/>
+                </a:tc>
+                <a:tc gridSpan="3">
+                  <a:txBody>
+                    <a:bodyPr/>
+                    <a:lstStyle/>
+                    <a:p>
+                      <a:r>
+                        <a:rPr lang="de-DE" sz="1200" dirty="0">
+                          <a:latin typeface="Arial" panose="020B0604020202020204" pitchFamily="34" charset="0"/>
+                          <a:cs typeface="Arial" panose="020B0604020202020204" pitchFamily="34" charset="0"/>
+                        </a:rPr>
+                        <a:t># Ringe / IC Zugehörigkeit</a:t>
+                      </a:r>
+                    </a:p>
+                  </a:txBody>
+                  <a:tcPr marL="36000" marR="36000" marT="36000" marB="36000"/>
+                </a:tc>
+                <a:tc hMerge="1">
+                  <a:txBody>
+                    <a:bodyPr/>
+                    <a:lstStyle/>
+                    <a:p>
+                      <a:endParaRPr lang="de-DE" sz="1200" dirty="0">
+                        <a:latin typeface="Arial" panose="020B0604020202020204" pitchFamily="34" charset="0"/>
+                        <a:cs typeface="Arial" panose="020B0604020202020204" pitchFamily="34" charset="0"/>
+                      </a:endParaRPr>
+                    </a:p>
+                  </a:txBody>
+                  <a:tcPr/>
+                </a:tc>
+                <a:tc hMerge="1">
+                  <a:txBody>
+                    <a:bodyPr/>
+                    <a:lstStyle/>
+                    <a:p>
+                      <a:endParaRPr lang="de-DE" sz="1200" dirty="0">
+                        <a:latin typeface="Arial" panose="020B0604020202020204" pitchFamily="34" charset="0"/>
+                        <a:cs typeface="Arial" panose="020B0604020202020204" pitchFamily="34" charset="0"/>
+                      </a:endParaRPr>
+                    </a:p>
+                  </a:txBody>
+                  <a:tcPr/>
+                </a:tc>
+                <a:extLst>
+                  <a:ext uri="{0D108BD9-81ED-4DB2-BD59-A6C34878D82A}">
+                    <a16:rowId xmlns:a16="http://schemas.microsoft.com/office/drawing/2014/main" val="1453451318"/>
+                  </a:ext>
+                </a:extLst>
+              </a:tr>
+              <a:tr h="0">
+                <a:tc vMerge="1">
+                  <a:txBody>
+                    <a:bodyPr/>
+                    <a:lstStyle/>
+                    <a:p>
+                      <a:endParaRPr lang="de-DE" sz="1200" dirty="0">
+                        <a:latin typeface="Arial" panose="020B0604020202020204" pitchFamily="34" charset="0"/>
+                        <a:cs typeface="Arial" panose="020B0604020202020204" pitchFamily="34" charset="0"/>
+                      </a:endParaRPr>
+                    </a:p>
+                  </a:txBody>
+                  <a:tcPr marL="36000" marR="36000" marT="36000" marB="36000"/>
+                </a:tc>
+                <a:tc>
+                  <a:txBody>
+                    <a:bodyPr/>
+                    <a:lstStyle/>
+                    <a:p>
+                      <a:pPr algn="ctr"/>
+                      <a:r>
+                        <a:rPr lang="de-DE" sz="1200" dirty="0">
+                          <a:latin typeface="Arial" panose="020B0604020202020204" pitchFamily="34" charset="0"/>
+                          <a:cs typeface="Arial" panose="020B0604020202020204" pitchFamily="34" charset="0"/>
+                        </a:rPr>
+                        <a:t>#</a:t>
+                      </a:r>
+                    </a:p>
+                  </a:txBody>
+                  <a:tcPr marL="36000" marR="36000" marT="36000" marB="36000"/>
+                </a:tc>
+                <a:tc>
+                  <a:txBody>
+                    <a:bodyPr/>
+                    <a:lstStyle/>
+                    <a:p>
+                      <a:r>
+                        <a:rPr lang="de-DE" sz="1200" dirty="0">
+                          <a:solidFill>
+                            <a:srgbClr val="FF0000"/>
+                          </a:solidFill>
+                          <a:latin typeface="Arial" panose="020B0604020202020204" pitchFamily="34" charset="0"/>
+                          <a:cs typeface="Arial" panose="020B0604020202020204" pitchFamily="34" charset="0"/>
+                        </a:rPr>
+                        <a:t>Mitglieder</a:t>
+                      </a:r>
+                    </a:p>
+                  </a:txBody>
+                  <a:tcPr marL="36000" marR="36000" marT="36000" marB="36000"/>
+                </a:tc>
+                <a:tc>
+                  <a:txBody>
+                    <a:bodyPr/>
+                    <a:lstStyle/>
+                    <a:p>
+                      <a:r>
+                        <a:rPr lang="de-DE" sz="1200" dirty="0">
+                          <a:latin typeface="Arial" panose="020B0604020202020204" pitchFamily="34" charset="0"/>
+                          <a:cs typeface="Arial" panose="020B0604020202020204" pitchFamily="34" charset="0"/>
+                        </a:rPr>
+                        <a:t>Atom A</a:t>
+                      </a:r>
+                    </a:p>
+                  </a:txBody>
+                  <a:tcPr marL="36000" marR="36000" marT="36000" marB="36000"/>
+                </a:tc>
+                <a:tc>
+                  <a:txBody>
+                    <a:bodyPr/>
+                    <a:lstStyle/>
+                    <a:p>
+                      <a:r>
+                        <a:rPr lang="de-DE" sz="1200" dirty="0">
+                          <a:latin typeface="Arial" panose="020B0604020202020204" pitchFamily="34" charset="0"/>
+                          <a:cs typeface="Arial" panose="020B0604020202020204" pitchFamily="34" charset="0"/>
+                        </a:rPr>
+                        <a:t>Atom B</a:t>
+                      </a:r>
+                    </a:p>
+                  </a:txBody>
+                  <a:tcPr marL="36000" marR="36000" marT="36000" marB="36000"/>
+                </a:tc>
+                <a:tc>
+                  <a:txBody>
+                    <a:bodyPr/>
+                    <a:lstStyle/>
+                    <a:p>
+                      <a:r>
+                        <a:rPr lang="de-DE" sz="1200" dirty="0">
+                          <a:latin typeface="Arial" panose="020B0604020202020204" pitchFamily="34" charset="0"/>
+                          <a:cs typeface="Arial" panose="020B0604020202020204" pitchFamily="34" charset="0"/>
+                        </a:rPr>
+                        <a:t>Atom C</a:t>
+                      </a:r>
+                    </a:p>
+                  </a:txBody>
+                  <a:tcPr marL="36000" marR="36000" marT="36000" marB="36000"/>
+                </a:tc>
+                <a:extLst>
+                  <a:ext uri="{0D108BD9-81ED-4DB2-BD59-A6C34878D82A}">
+                    <a16:rowId xmlns:a16="http://schemas.microsoft.com/office/drawing/2014/main" val="1340260050"/>
+                  </a:ext>
+                </a:extLst>
+              </a:tr>
+              <a:tr h="0">
+                <a:tc>
+                  <a:txBody>
+                    <a:bodyPr/>
+                    <a:lstStyle/>
+                    <a:p>
+                      <a:r>
+                        <a:rPr lang="de-DE" sz="1200" dirty="0">
+                          <a:latin typeface="Arial" panose="020B0604020202020204" pitchFamily="34" charset="0"/>
+                          <a:cs typeface="Arial" panose="020B0604020202020204" pitchFamily="34" charset="0"/>
+                        </a:rPr>
+                        <a:t>IC</a:t>
+                      </a:r>
+                    </a:p>
+                  </a:txBody>
+                  <a:tcPr marL="36000" marR="36000" marT="36000" marB="36000"/>
+                </a:tc>
+                <a:tc>
+                  <a:txBody>
+                    <a:bodyPr/>
+                    <a:lstStyle/>
+                    <a:p>
+                      <a:pPr algn="ctr"/>
+                      <a:r>
+                        <a:rPr lang="de-DE" sz="1200" dirty="0">
+                          <a:latin typeface="Arial" panose="020B0604020202020204" pitchFamily="34" charset="0"/>
+                          <a:cs typeface="Arial" panose="020B0604020202020204" pitchFamily="34" charset="0"/>
+                        </a:rPr>
+                        <a:t>3</a:t>
+                      </a:r>
+                    </a:p>
+                  </a:txBody>
+                  <a:tcPr marL="36000" marR="36000" marT="36000" marB="36000"/>
+                </a:tc>
+                <a:tc>
+                  <a:txBody>
+                    <a:bodyPr/>
+                    <a:lstStyle/>
+                    <a:p>
+                      <a:r>
+                        <a:rPr lang="de-DE" sz="1200" dirty="0">
+                          <a:latin typeface="Arial" panose="020B0604020202020204" pitchFamily="34" charset="0"/>
+                          <a:cs typeface="Arial" panose="020B0604020202020204" pitchFamily="34" charset="0"/>
+                        </a:rPr>
+                        <a:t>{1, 2, 7}</a:t>
+                      </a:r>
+                    </a:p>
+                  </a:txBody>
+                  <a:tcPr marL="36000" marR="36000" marT="36000" marB="36000"/>
+                </a:tc>
+                <a:tc>
+                  <a:txBody>
+                    <a:bodyPr/>
+                    <a:lstStyle/>
+                    <a:p>
+                      <a:r>
+                        <a:rPr lang="de-DE" sz="1200" dirty="0">
+                          <a:latin typeface="Arial" panose="020B0604020202020204" pitchFamily="34" charset="0"/>
+                          <a:cs typeface="Arial" panose="020B0604020202020204" pitchFamily="34" charset="0"/>
+                        </a:rPr>
+                        <a:t>2</a:t>
+                      </a:r>
+                    </a:p>
+                  </a:txBody>
+                  <a:tcPr marL="36000" marR="36000" marT="36000" marB="36000"/>
+                </a:tc>
+                <a:tc>
+                  <a:txBody>
+                    <a:bodyPr/>
+                    <a:lstStyle/>
+                    <a:p>
+                      <a:r>
+                        <a:rPr lang="de-DE" sz="1200" dirty="0">
+                          <a:latin typeface="Arial" panose="020B0604020202020204" pitchFamily="34" charset="0"/>
+                          <a:cs typeface="Arial" panose="020B0604020202020204" pitchFamily="34" charset="0"/>
+                        </a:rPr>
+                        <a:t>2</a:t>
+                      </a:r>
+                    </a:p>
+                  </a:txBody>
+                  <a:tcPr marL="36000" marR="36000" marT="36000" marB="36000"/>
+                </a:tc>
+                <a:tc>
+                  <a:txBody>
+                    <a:bodyPr/>
+                    <a:lstStyle/>
+                    <a:p>
+                      <a:r>
+                        <a:rPr lang="de-DE" sz="1200" dirty="0">
+                          <a:latin typeface="Arial" panose="020B0604020202020204" pitchFamily="34" charset="0"/>
+                          <a:cs typeface="Arial" panose="020B0604020202020204" pitchFamily="34" charset="0"/>
+                        </a:rPr>
+                        <a:t>1</a:t>
+                      </a:r>
+                    </a:p>
+                  </a:txBody>
+                  <a:tcPr marL="36000" marR="36000" marT="36000" marB="36000"/>
+                </a:tc>
+                <a:extLst>
+                  <a:ext uri="{0D108BD9-81ED-4DB2-BD59-A6C34878D82A}">
+                    <a16:rowId xmlns:a16="http://schemas.microsoft.com/office/drawing/2014/main" val="132837734"/>
+                  </a:ext>
+                </a:extLst>
+              </a:tr>
+              <a:tr h="0">
+                <a:tc>
+                  <a:txBody>
+                    <a:bodyPr/>
+                    <a:lstStyle/>
+                    <a:p>
+                      <a:r>
+                        <a:rPr lang="de-DE" sz="1200" dirty="0">
+                          <a:latin typeface="Arial" panose="020B0604020202020204" pitchFamily="34" charset="0"/>
+                          <a:cs typeface="Arial" panose="020B0604020202020204" pitchFamily="34" charset="0"/>
+                        </a:rPr>
+                        <a:t>SSSR</a:t>
+                      </a:r>
+                    </a:p>
+                  </a:txBody>
+                  <a:tcPr marL="36000" marR="36000" marT="36000" marB="36000"/>
+                </a:tc>
+                <a:tc>
+                  <a:txBody>
+                    <a:bodyPr/>
+                    <a:lstStyle/>
+                    <a:p>
+                      <a:pPr algn="ctr"/>
+                      <a:r>
+                        <a:rPr lang="de-DE" sz="1200" dirty="0">
+                          <a:latin typeface="Arial" panose="020B0604020202020204" pitchFamily="34" charset="0"/>
+                          <a:cs typeface="Arial" panose="020B0604020202020204" pitchFamily="34" charset="0"/>
+                        </a:rPr>
+                        <a:t>3</a:t>
+                      </a:r>
+                    </a:p>
+                  </a:txBody>
+                  <a:tcPr marL="36000" marR="36000" marT="36000" marB="36000"/>
+                </a:tc>
+                <a:tc>
+                  <a:txBody>
+                    <a:bodyPr/>
+                    <a:lstStyle/>
+                    <a:p>
+                      <a:r>
+                        <a:rPr lang="de-DE" sz="1200" dirty="0">
+                          <a:latin typeface="Arial" panose="020B0604020202020204" pitchFamily="34" charset="0"/>
+                          <a:cs typeface="Arial" panose="020B0604020202020204" pitchFamily="34" charset="0"/>
+                        </a:rPr>
+                        <a:t>{(1, 2, x) x ∈ {3, 4, 5, 6}}</a:t>
+                      </a:r>
+                    </a:p>
+                  </a:txBody>
+                  <a:tcPr marL="36000" marR="36000" marT="36000" marB="36000"/>
+                </a:tc>
+                <a:tc>
+                  <a:txBody>
+                    <a:bodyPr/>
+                    <a:lstStyle/>
+                    <a:p>
+                      <a:r>
+                        <a:rPr lang="de-DE" sz="1200" dirty="0">
+                          <a:latin typeface="Arial" panose="020B0604020202020204" pitchFamily="34" charset="0"/>
+                          <a:cs typeface="Arial" panose="020B0604020202020204" pitchFamily="34" charset="0"/>
+                        </a:rPr>
+                        <a:t>2</a:t>
+                      </a:r>
+                    </a:p>
+                  </a:txBody>
+                  <a:tcPr marL="36000" marR="36000" marT="36000" marB="36000"/>
+                </a:tc>
+                <a:tc>
+                  <a:txBody>
+                    <a:bodyPr/>
+                    <a:lstStyle/>
+                    <a:p>
+                      <a:r>
+                        <a:rPr lang="de-DE" sz="1200" dirty="0">
+                          <a:latin typeface="Arial" panose="020B0604020202020204" pitchFamily="34" charset="0"/>
+                          <a:cs typeface="Arial" panose="020B0604020202020204" pitchFamily="34" charset="0"/>
+                        </a:rPr>
+                        <a:t>1 oder 2</a:t>
+                      </a:r>
+                    </a:p>
+                  </a:txBody>
+                  <a:tcPr marL="36000" marR="36000" marT="36000" marB="36000"/>
+                </a:tc>
+                <a:tc>
+                  <a:txBody>
+                    <a:bodyPr/>
+                    <a:lstStyle/>
+                    <a:p>
+                      <a:r>
+                        <a:rPr lang="de-DE" sz="1200" dirty="0">
+                          <a:latin typeface="Arial" panose="020B0604020202020204" pitchFamily="34" charset="0"/>
+                          <a:cs typeface="Arial" panose="020B0604020202020204" pitchFamily="34" charset="0"/>
+                        </a:rPr>
+                        <a:t>1</a:t>
+                      </a:r>
+                    </a:p>
+                  </a:txBody>
+                  <a:tcPr marL="36000" marR="36000" marT="36000" marB="36000"/>
+                </a:tc>
+                <a:extLst>
+                  <a:ext uri="{0D108BD9-81ED-4DB2-BD59-A6C34878D82A}">
+                    <a16:rowId xmlns:a16="http://schemas.microsoft.com/office/drawing/2014/main" val="808948578"/>
+                  </a:ext>
+                </a:extLst>
+              </a:tr>
+              <a:tr h="0">
+                <a:tc>
+                  <a:txBody>
+                    <a:bodyPr/>
+                    <a:lstStyle/>
+                    <a:p>
+                      <a:r>
+                        <a:rPr lang="de-DE" sz="1200" dirty="0">
+                          <a:latin typeface="Arial" panose="020B0604020202020204" pitchFamily="34" charset="0"/>
+                          <a:cs typeface="Arial" panose="020B0604020202020204" pitchFamily="34" charset="0"/>
+                        </a:rPr>
+                        <a:t>RC</a:t>
+                      </a:r>
+                    </a:p>
+                  </a:txBody>
+                  <a:tcPr marL="36000" marR="36000" marT="36000" marB="36000"/>
+                </a:tc>
+                <a:tc>
+                  <a:txBody>
+                    <a:bodyPr/>
+                    <a:lstStyle/>
+                    <a:p>
+                      <a:pPr algn="ctr"/>
+                      <a:r>
+                        <a:rPr lang="de-DE" sz="1200" dirty="0">
+                          <a:latin typeface="Arial" panose="020B0604020202020204" pitchFamily="34" charset="0"/>
+                          <a:cs typeface="Arial" panose="020B0604020202020204" pitchFamily="34" charset="0"/>
+                        </a:rPr>
+                        <a:t>6</a:t>
+                      </a:r>
+                    </a:p>
+                  </a:txBody>
+                  <a:tcPr marL="36000" marR="36000" marT="36000" marB="36000"/>
+                </a:tc>
+                <a:tc>
+                  <a:txBody>
+                    <a:bodyPr/>
+                    <a:lstStyle/>
+                    <a:p>
+                      <a:r>
+                        <a:rPr lang="de-DE" sz="1200" dirty="0">
+                          <a:latin typeface="Arial" panose="020B0604020202020204" pitchFamily="34" charset="0"/>
+                          <a:cs typeface="Arial" panose="020B0604020202020204" pitchFamily="34" charset="0"/>
+                        </a:rPr>
+                        <a:t>{1, 2, 3, 4, 5, 6}</a:t>
+                      </a:r>
+                    </a:p>
+                  </a:txBody>
+                  <a:tcPr marL="36000" marR="36000" marT="36000" marB="36000"/>
+                </a:tc>
+                <a:tc>
+                  <a:txBody>
+                    <a:bodyPr/>
+                    <a:lstStyle/>
+                    <a:p>
+                      <a:r>
+                        <a:rPr lang="de-DE" sz="1200" dirty="0">
+                          <a:latin typeface="Arial" panose="020B0604020202020204" pitchFamily="34" charset="0"/>
+                          <a:cs typeface="Arial" panose="020B0604020202020204" pitchFamily="34" charset="0"/>
+                        </a:rPr>
+                        <a:t>5</a:t>
+                      </a:r>
+                    </a:p>
+                  </a:txBody>
+                  <a:tcPr marL="36000" marR="36000" marT="36000" marB="36000"/>
+                </a:tc>
+                <a:tc>
+                  <a:txBody>
+                    <a:bodyPr/>
+                    <a:lstStyle/>
+                    <a:p>
+                      <a:r>
+                        <a:rPr lang="de-DE" sz="1200" dirty="0">
+                          <a:latin typeface="Arial" panose="020B0604020202020204" pitchFamily="34" charset="0"/>
+                          <a:cs typeface="Arial" panose="020B0604020202020204" pitchFamily="34" charset="0"/>
+                        </a:rPr>
+                        <a:t>3</a:t>
+                      </a:r>
+                    </a:p>
+                  </a:txBody>
+                  <a:tcPr marL="36000" marR="36000" marT="36000" marB="36000"/>
+                </a:tc>
+                <a:tc>
+                  <a:txBody>
+                    <a:bodyPr/>
+                    <a:lstStyle/>
+                    <a:p>
+                      <a:r>
+                        <a:rPr lang="de-DE" sz="1200" dirty="0">
+                          <a:latin typeface="Arial" panose="020B0604020202020204" pitchFamily="34" charset="0"/>
+                          <a:cs typeface="Arial" panose="020B0604020202020204" pitchFamily="34" charset="0"/>
+                        </a:rPr>
+                        <a:t>4</a:t>
+                      </a:r>
+                    </a:p>
+                  </a:txBody>
+                  <a:tcPr marL="36000" marR="36000" marT="36000" marB="36000"/>
+                </a:tc>
+                <a:extLst>
+                  <a:ext uri="{0D108BD9-81ED-4DB2-BD59-A6C34878D82A}">
+                    <a16:rowId xmlns:a16="http://schemas.microsoft.com/office/drawing/2014/main" val="922026689"/>
+                  </a:ext>
+                </a:extLst>
+              </a:tr>
+            </a:tbl>
+          </a:graphicData>
+        </a:graphic>
+      </p:graphicFrame>
+    </p:spTree>
+    <p:extLst>
+      <p:ext uri="{BB962C8B-B14F-4D97-AF65-F5344CB8AC3E}">
+        <p14:creationId xmlns:p14="http://schemas.microsoft.com/office/powerpoint/2010/main" val="269291869"/>
+      </p:ext>
+    </p:extLst>
+  </p:cSld>
+  <p:clrMapOvr>
+    <a:masterClrMapping/>
+  </p:clrMapOvr>
+</p:sld>
+</file>
+
+<file path=ppt/slides/slide7.xml><?xml version="1.0" encoding="utf-8"?>
+<p:sld xmlns:a="http://schemas.openxmlformats.org/drawingml/2006/main" xmlns:r="http://schemas.openxmlformats.org/officeDocument/2006/relationships" xmlns:p="http://schemas.openxmlformats.org/presentationml/2006/main">
+  <p:cSld>
+    <p:spTree>
+      <p:nvGrpSpPr>
+        <p:cNvPr id="1" name=""/>
+        <p:cNvGrpSpPr/>
+        <p:nvPr/>
+      </p:nvGrpSpPr>
+      <p:grpSpPr>
+        <a:xfrm>
+          <a:off x="0" y="0"/>
+          <a:ext cx="0" cy="0"/>
+          <a:chOff x="0" y="0"/>
+          <a:chExt cx="0" cy="0"/>
+        </a:xfrm>
+      </p:grpSpPr>
+      <p:sp>
+        <p:nvSpPr>
+          <p:cNvPr id="2" name="Titel 1">
+            <a:extLst>
+              <a:ext uri="{FF2B5EF4-FFF2-40B4-BE49-F238E27FC236}">
+                <a16:creationId xmlns:a16="http://schemas.microsoft.com/office/drawing/2014/main" id="{D9D3D060-463B-4E3F-8136-FC2B3C31E1DE}"/>
+              </a:ext>
+            </a:extLst>
+          </p:cNvPr>
+          <p:cNvSpPr>
+            <a:spLocks noGrp="1"/>
+          </p:cNvSpPr>
+          <p:nvPr>
+            <p:ph type="title"/>
+          </p:nvPr>
+        </p:nvSpPr>
+        <p:spPr/>
+        <p:txBody>
+          <a:bodyPr/>
+          <a:lstStyle/>
+          <a:p>
+            <a:r>
+              <a:rPr lang="de-DE" dirty="0"/>
+              <a:t>Abb3_34</a:t>
+            </a:r>
+          </a:p>
+        </p:txBody>
+      </p:sp>
+      <p:graphicFrame>
+        <p:nvGraphicFramePr>
+          <p:cNvPr id="3" name="Tabelle 2">
+            <a:extLst>
+              <a:ext uri="{FF2B5EF4-FFF2-40B4-BE49-F238E27FC236}">
+                <a16:creationId xmlns:a16="http://schemas.microsoft.com/office/drawing/2014/main" id="{A808B2E9-6784-4AD4-A8C9-63FFC8AFC1D5}"/>
+              </a:ext>
+            </a:extLst>
+          </p:cNvPr>
+          <p:cNvGraphicFramePr>
+            <a:graphicFrameLocks noGrp="1"/>
+          </p:cNvGraphicFramePr>
+          <p:nvPr>
+            <p:extLst>
+              <p:ext uri="{D42A27DB-BD31-4B8C-83A1-F6EECF244321}">
+                <p14:modId xmlns:p14="http://schemas.microsoft.com/office/powerpoint/2010/main" val="3669017782"/>
+              </p:ext>
+            </p:extLst>
+          </p:nvPr>
+        </p:nvGraphicFramePr>
+        <p:xfrm>
+          <a:off x="2031999" y="2501900"/>
+          <a:ext cx="2248855" cy="764640"/>
+        </p:xfrm>
+        <a:graphic>
+          <a:graphicData uri="http://schemas.openxmlformats.org/drawingml/2006/table">
+            <a:tbl>
+              <a:tblPr firstRow="1" bandRow="1">
+                <a:tableStyleId>{5940675A-B579-460E-94D1-54222C63F5DA}</a:tableStyleId>
+              </a:tblPr>
+              <a:tblGrid>
+                <a:gridCol w="808855">
+                  <a:extLst>
+                    <a:ext uri="{9D8B030D-6E8A-4147-A177-3AD203B41FA5}">
+                      <a16:colId xmlns:a16="http://schemas.microsoft.com/office/drawing/2014/main" val="3225287174"/>
+                    </a:ext>
+                  </a:extLst>
+                </a:gridCol>
+                <a:gridCol w="720000">
+                  <a:extLst>
+                    <a:ext uri="{9D8B030D-6E8A-4147-A177-3AD203B41FA5}">
+                      <a16:colId xmlns:a16="http://schemas.microsoft.com/office/drawing/2014/main" val="3595241694"/>
+                    </a:ext>
+                  </a:extLst>
+                </a:gridCol>
+                <a:gridCol w="720000">
+                  <a:extLst>
+                    <a:ext uri="{9D8B030D-6E8A-4147-A177-3AD203B41FA5}">
+                      <a16:colId xmlns:a16="http://schemas.microsoft.com/office/drawing/2014/main" val="3131738988"/>
+                    </a:ext>
+                  </a:extLst>
+                </a:gridCol>
+              </a:tblGrid>
+              <a:tr h="0">
+                <a:tc>
+                  <a:txBody>
+                    <a:bodyPr/>
+                    <a:lstStyle/>
+                    <a:p>
+                      <a:r>
+                        <a:rPr lang="de-DE" sz="1200" dirty="0">
+                          <a:latin typeface="Arial" panose="020B0604020202020204" pitchFamily="34" charset="0"/>
+                          <a:cs typeface="Arial" panose="020B0604020202020204" pitchFamily="34" charset="0"/>
+                        </a:rPr>
+                        <a:t>Struktur</a:t>
+                      </a:r>
+                    </a:p>
+                  </a:txBody>
+                  <a:tcPr marL="36000" marR="36000" marT="36000" marB="36000"/>
+                </a:tc>
+                <a:tc>
+                  <a:txBody>
+                    <a:bodyPr/>
+                    <a:lstStyle/>
+                    <a:p>
+                      <a:pPr algn="ctr"/>
+                      <a:r>
+                        <a:rPr lang="de-DE" sz="1200" dirty="0">
+                          <a:latin typeface="Arial" panose="020B0604020202020204" pitchFamily="34" charset="0"/>
+                          <a:cs typeface="Arial" panose="020B0604020202020204" pitchFamily="34" charset="0"/>
+                        </a:rPr>
+                        <a:t># URFS</a:t>
+                      </a:r>
+                    </a:p>
+                  </a:txBody>
+                  <a:tcPr marL="36000" marR="36000" marT="36000" marB="36000"/>
+                </a:tc>
+                <a:tc>
+                  <a:txBody>
+                    <a:bodyPr/>
+                    <a:lstStyle/>
+                    <a:p>
+                      <a:pPr algn="ctr"/>
+                      <a:r>
+                        <a:rPr lang="de-DE" sz="1200" dirty="0">
+                          <a:latin typeface="Arial" panose="020B0604020202020204" pitchFamily="34" charset="0"/>
+                          <a:cs typeface="Arial" panose="020B0604020202020204" pitchFamily="34" charset="0"/>
+                        </a:rPr>
+                        <a:t># </a:t>
+                      </a:r>
+                      <a:r>
+                        <a:rPr lang="de-DE" sz="1200" dirty="0" err="1">
+                          <a:latin typeface="Arial" panose="020B0604020202020204" pitchFamily="34" charset="0"/>
+                          <a:cs typeface="Arial" panose="020B0604020202020204" pitchFamily="34" charset="0"/>
+                        </a:rPr>
+                        <a:t>Ics</a:t>
+                      </a:r>
+                      <a:endParaRPr lang="de-DE" sz="1200" dirty="0">
+                        <a:latin typeface="Arial" panose="020B0604020202020204" pitchFamily="34" charset="0"/>
+                        <a:cs typeface="Arial" panose="020B0604020202020204" pitchFamily="34" charset="0"/>
+                      </a:endParaRPr>
+                    </a:p>
+                  </a:txBody>
+                  <a:tcPr marL="36000" marR="36000" marT="36000" marB="36000"/>
+                </a:tc>
+                <a:extLst>
+                  <a:ext uri="{0D108BD9-81ED-4DB2-BD59-A6C34878D82A}">
+                    <a16:rowId xmlns:a16="http://schemas.microsoft.com/office/drawing/2014/main" val="132837734"/>
+                  </a:ext>
+                </a:extLst>
+              </a:tr>
+              <a:tr h="0">
+                <a:tc>
+                  <a:txBody>
+                    <a:bodyPr/>
+                    <a:lstStyle/>
+                    <a:p>
+                      <a:r>
+                        <a:rPr lang="de-DE" sz="1200" dirty="0" err="1">
+                          <a:latin typeface="Arial" panose="020B0604020202020204" pitchFamily="34" charset="0"/>
+                          <a:cs typeface="Arial" panose="020B0604020202020204" pitchFamily="34" charset="0"/>
+                        </a:rPr>
+                        <a:t>Cuban</a:t>
+                      </a:r>
+                      <a:endParaRPr lang="de-DE" sz="1200" dirty="0">
+                        <a:latin typeface="Arial" panose="020B0604020202020204" pitchFamily="34" charset="0"/>
+                        <a:cs typeface="Arial" panose="020B0604020202020204" pitchFamily="34" charset="0"/>
+                      </a:endParaRPr>
+                    </a:p>
+                  </a:txBody>
+                  <a:tcPr marL="36000" marR="36000" marT="36000" marB="36000"/>
+                </a:tc>
+                <a:tc>
+                  <a:txBody>
+                    <a:bodyPr/>
+                    <a:lstStyle/>
+                    <a:p>
+                      <a:pPr algn="ctr"/>
+                      <a:r>
+                        <a:rPr lang="de-DE" sz="1200" dirty="0">
+                          <a:latin typeface="Arial" panose="020B0604020202020204" pitchFamily="34" charset="0"/>
+                          <a:cs typeface="Arial" panose="020B0604020202020204" pitchFamily="34" charset="0"/>
+                        </a:rPr>
+                        <a:t>6</a:t>
+                      </a:r>
+                    </a:p>
+                  </a:txBody>
+                  <a:tcPr marL="36000" marR="36000" marT="36000" marB="36000"/>
+                </a:tc>
+                <a:tc>
+                  <a:txBody>
+                    <a:bodyPr/>
+                    <a:lstStyle/>
+                    <a:p>
+                      <a:pPr algn="ctr"/>
+                      <a:r>
+                        <a:rPr lang="de-DE" sz="1200" dirty="0">
+                          <a:latin typeface="Arial" panose="020B0604020202020204" pitchFamily="34" charset="0"/>
+                          <a:cs typeface="Arial" panose="020B0604020202020204" pitchFamily="34" charset="0"/>
+                        </a:rPr>
+                        <a:t>1</a:t>
+                      </a:r>
+                    </a:p>
+                  </a:txBody>
+                  <a:tcPr marL="36000" marR="36000" marT="36000" marB="36000"/>
+                </a:tc>
+                <a:extLst>
+                  <a:ext uri="{0D108BD9-81ED-4DB2-BD59-A6C34878D82A}">
+                    <a16:rowId xmlns:a16="http://schemas.microsoft.com/office/drawing/2014/main" val="808948578"/>
+                  </a:ext>
+                </a:extLst>
+              </a:tr>
+              <a:tr h="0">
+                <a:tc>
+                  <a:txBody>
+                    <a:bodyPr/>
+                    <a:lstStyle/>
+                    <a:p>
+                      <a:r>
+                        <a:rPr lang="de-DE" sz="1200" dirty="0" err="1">
+                          <a:latin typeface="Arial" panose="020B0604020202020204" pitchFamily="34" charset="0"/>
+                          <a:cs typeface="Arial" panose="020B0604020202020204" pitchFamily="34" charset="0"/>
+                        </a:rPr>
+                        <a:t>Cyclophan</a:t>
+                      </a:r>
+                      <a:endParaRPr lang="de-DE" sz="1200" dirty="0">
+                        <a:latin typeface="Arial" panose="020B0604020202020204" pitchFamily="34" charset="0"/>
+                        <a:cs typeface="Arial" panose="020B0604020202020204" pitchFamily="34" charset="0"/>
+                      </a:endParaRPr>
+                    </a:p>
+                  </a:txBody>
+                  <a:tcPr marL="36000" marR="36000" marT="36000" marB="36000"/>
+                </a:tc>
+                <a:tc>
+                  <a:txBody>
+                    <a:bodyPr/>
+                    <a:lstStyle/>
+                    <a:p>
+                      <a:pPr algn="ctr"/>
+                      <a:r>
+                        <a:rPr lang="de-DE" sz="1200" dirty="0">
+                          <a:latin typeface="Arial" panose="020B0604020202020204" pitchFamily="34" charset="0"/>
+                          <a:cs typeface="Arial" panose="020B0604020202020204" pitchFamily="34" charset="0"/>
+                        </a:rPr>
+                        <a:t>3</a:t>
+                      </a:r>
+                    </a:p>
+                  </a:txBody>
+                  <a:tcPr marL="36000" marR="36000" marT="36000" marB="36000"/>
+                </a:tc>
+                <a:tc>
+                  <a:txBody>
+                    <a:bodyPr/>
+                    <a:lstStyle/>
+                    <a:p>
+                      <a:pPr algn="ctr"/>
+                      <a:r>
+                        <a:rPr lang="de-DE" sz="1200" dirty="0">
+                          <a:latin typeface="Arial" panose="020B0604020202020204" pitchFamily="34" charset="0"/>
+                          <a:cs typeface="Arial" panose="020B0604020202020204" pitchFamily="34" charset="0"/>
+                        </a:rPr>
+                        <a:t>3</a:t>
+                      </a:r>
+                    </a:p>
+                  </a:txBody>
+                  <a:tcPr marL="36000" marR="36000" marT="36000" marB="36000"/>
+                </a:tc>
+                <a:extLst>
+                  <a:ext uri="{0D108BD9-81ED-4DB2-BD59-A6C34878D82A}">
+                    <a16:rowId xmlns:a16="http://schemas.microsoft.com/office/drawing/2014/main" val="922026689"/>
+                  </a:ext>
+                </a:extLst>
+              </a:tr>
+            </a:tbl>
+          </a:graphicData>
+        </a:graphic>
+      </p:graphicFrame>
+      <p:graphicFrame>
+        <p:nvGraphicFramePr>
+          <p:cNvPr id="4" name="Tabelle 3">
+            <a:extLst>
+              <a:ext uri="{FF2B5EF4-FFF2-40B4-BE49-F238E27FC236}">
+                <a16:creationId xmlns:a16="http://schemas.microsoft.com/office/drawing/2014/main" id="{96EE7C87-5EB1-4320-B93A-04FAA894B6D8}"/>
+              </a:ext>
+            </a:extLst>
+          </p:cNvPr>
+          <p:cNvGraphicFramePr>
+            <a:graphicFrameLocks noGrp="1"/>
+          </p:cNvGraphicFramePr>
+          <p:nvPr>
+            <p:extLst>
+              <p:ext uri="{D42A27DB-BD31-4B8C-83A1-F6EECF244321}">
+                <p14:modId xmlns:p14="http://schemas.microsoft.com/office/powerpoint/2010/main" val="3740950131"/>
+              </p:ext>
+            </p:extLst>
+          </p:nvPr>
+        </p:nvGraphicFramePr>
+        <p:xfrm>
+          <a:off x="5534487" y="2501900"/>
+          <a:ext cx="3096000" cy="764640"/>
+        </p:xfrm>
+        <a:graphic>
+          <a:graphicData uri="http://schemas.openxmlformats.org/drawingml/2006/table">
+            <a:tbl>
+              <a:tblPr firstRow="1" bandRow="1">
+                <a:tableStyleId>{5940675A-B579-460E-94D1-54222C63F5DA}</a:tableStyleId>
+              </a:tblPr>
+              <a:tblGrid>
+                <a:gridCol w="936000">
+                  <a:extLst>
+                    <a:ext uri="{9D8B030D-6E8A-4147-A177-3AD203B41FA5}">
+                      <a16:colId xmlns:a16="http://schemas.microsoft.com/office/drawing/2014/main" val="2755593253"/>
+                    </a:ext>
+                  </a:extLst>
+                </a:gridCol>
+                <a:gridCol w="720000">
+                  <a:extLst>
+                    <a:ext uri="{9D8B030D-6E8A-4147-A177-3AD203B41FA5}">
+                      <a16:colId xmlns:a16="http://schemas.microsoft.com/office/drawing/2014/main" val="2300903534"/>
+                    </a:ext>
+                  </a:extLst>
+                </a:gridCol>
+                <a:gridCol w="720000">
+                  <a:extLst>
+                    <a:ext uri="{9D8B030D-6E8A-4147-A177-3AD203B41FA5}">
+                      <a16:colId xmlns:a16="http://schemas.microsoft.com/office/drawing/2014/main" val="2303460362"/>
+                    </a:ext>
+                  </a:extLst>
+                </a:gridCol>
+                <a:gridCol w="720000">
+                  <a:extLst>
+                    <a:ext uri="{9D8B030D-6E8A-4147-A177-3AD203B41FA5}">
+                      <a16:colId xmlns:a16="http://schemas.microsoft.com/office/drawing/2014/main" val="1805857702"/>
+                    </a:ext>
+                  </a:extLst>
+                </a:gridCol>
+              </a:tblGrid>
+              <a:tr h="0">
+                <a:tc>
+                  <a:txBody>
+                    <a:bodyPr/>
+                    <a:lstStyle/>
+                    <a:p>
+                      <a:r>
+                        <a:rPr lang="de-DE" sz="1200" dirty="0">
+                          <a:latin typeface="Arial" panose="020B0604020202020204" pitchFamily="34" charset="0"/>
+                          <a:cs typeface="Arial" panose="020B0604020202020204" pitchFamily="34" charset="0"/>
+                        </a:rPr>
+                        <a:t>Ringkonzept</a:t>
+                      </a:r>
+                    </a:p>
+                  </a:txBody>
+                  <a:tcPr marL="36000" marR="36000" marT="36000" marB="36000"/>
+                </a:tc>
+                <a:tc>
+                  <a:txBody>
+                    <a:bodyPr/>
+                    <a:lstStyle/>
+                    <a:p>
+                      <a:pPr algn="ctr"/>
+                      <a:r>
+                        <a:rPr lang="de-DE" sz="1200" dirty="0">
+                          <a:latin typeface="Arial" panose="020B0604020202020204" pitchFamily="34" charset="0"/>
+                          <a:cs typeface="Arial" panose="020B0604020202020204" pitchFamily="34" charset="0"/>
+                        </a:rPr>
+                        <a:t>Atom A</a:t>
+                      </a:r>
+                    </a:p>
+                  </a:txBody>
+                  <a:tcPr marL="36000" marR="36000" marT="36000" marB="36000"/>
+                </a:tc>
+                <a:tc>
+                  <a:txBody>
+                    <a:bodyPr/>
+                    <a:lstStyle/>
+                    <a:p>
+                      <a:pPr algn="ctr"/>
+                      <a:r>
+                        <a:rPr lang="de-DE" sz="1200" dirty="0">
+                          <a:latin typeface="Arial" panose="020B0604020202020204" pitchFamily="34" charset="0"/>
+                          <a:cs typeface="Arial" panose="020B0604020202020204" pitchFamily="34" charset="0"/>
+                        </a:rPr>
+                        <a:t>Atom B</a:t>
+                      </a:r>
+                    </a:p>
+                  </a:txBody>
+                  <a:tcPr marL="36000" marR="36000" marT="36000" marB="36000"/>
+                </a:tc>
+                <a:tc>
+                  <a:txBody>
+                    <a:bodyPr/>
+                    <a:lstStyle/>
+                    <a:p>
+                      <a:pPr algn="ctr"/>
+                      <a:r>
+                        <a:rPr lang="de-DE" sz="1200" dirty="0">
+                          <a:latin typeface="Arial" panose="020B0604020202020204" pitchFamily="34" charset="0"/>
+                          <a:cs typeface="Arial" panose="020B0604020202020204" pitchFamily="34" charset="0"/>
+                        </a:rPr>
+                        <a:t>Atom C</a:t>
+                      </a:r>
+                    </a:p>
+                  </a:txBody>
+                  <a:tcPr marL="36000" marR="36000" marT="36000" marB="36000"/>
+                </a:tc>
+                <a:extLst>
+                  <a:ext uri="{0D108BD9-81ED-4DB2-BD59-A6C34878D82A}">
+                    <a16:rowId xmlns:a16="http://schemas.microsoft.com/office/drawing/2014/main" val="272709758"/>
+                  </a:ext>
+                </a:extLst>
+              </a:tr>
+              <a:tr h="0">
+                <a:tc>
+                  <a:txBody>
+                    <a:bodyPr/>
+                    <a:lstStyle/>
+                    <a:p>
+                      <a:r>
+                        <a:rPr lang="de-DE" sz="1200" dirty="0">
+                          <a:latin typeface="Arial" panose="020B0604020202020204" pitchFamily="34" charset="0"/>
+                          <a:cs typeface="Arial" panose="020B0604020202020204" pitchFamily="34" charset="0"/>
+                        </a:rPr>
+                        <a:t>URFs</a:t>
+                      </a:r>
+                    </a:p>
+                  </a:txBody>
+                  <a:tcPr marL="36000" marR="36000" marT="36000" marB="36000"/>
+                </a:tc>
+                <a:tc>
+                  <a:txBody>
+                    <a:bodyPr/>
+                    <a:lstStyle/>
+                    <a:p>
+                      <a:pPr algn="ctr"/>
+                      <a:r>
+                        <a:rPr lang="de-DE" sz="1200" dirty="0">
+                          <a:latin typeface="Arial" panose="020B0604020202020204" pitchFamily="34" charset="0"/>
+                          <a:cs typeface="Arial" panose="020B0604020202020204" pitchFamily="34" charset="0"/>
+                        </a:rPr>
+                        <a:t>3</a:t>
+                      </a:r>
+                    </a:p>
+                  </a:txBody>
+                  <a:tcPr marL="36000" marR="36000" marT="36000" marB="36000"/>
+                </a:tc>
+                <a:tc>
+                  <a:txBody>
+                    <a:bodyPr/>
+                    <a:lstStyle/>
+                    <a:p>
+                      <a:pPr algn="ctr"/>
+                      <a:r>
+                        <a:rPr lang="de-DE" sz="1200" dirty="0">
+                          <a:latin typeface="Arial" panose="020B0604020202020204" pitchFamily="34" charset="0"/>
+                          <a:cs typeface="Arial" panose="020B0604020202020204" pitchFamily="34" charset="0"/>
+                        </a:rPr>
+                        <a:t>1</a:t>
+                      </a:r>
+                    </a:p>
+                  </a:txBody>
+                  <a:tcPr marL="36000" marR="36000" marT="36000" marB="36000"/>
+                </a:tc>
+                <a:tc>
+                  <a:txBody>
+                    <a:bodyPr/>
+                    <a:lstStyle/>
+                    <a:p>
+                      <a:pPr algn="ctr"/>
+                      <a:r>
+                        <a:rPr lang="de-DE" sz="1200" dirty="0">
+                          <a:latin typeface="Arial" panose="020B0604020202020204" pitchFamily="34" charset="0"/>
+                          <a:cs typeface="Arial" panose="020B0604020202020204" pitchFamily="34" charset="0"/>
+                        </a:rPr>
+                        <a:t>3</a:t>
+                      </a:r>
+                    </a:p>
+                  </a:txBody>
+                  <a:tcPr marL="36000" marR="36000" marT="36000" marB="36000"/>
+                </a:tc>
+                <a:extLst>
+                  <a:ext uri="{0D108BD9-81ED-4DB2-BD59-A6C34878D82A}">
+                    <a16:rowId xmlns:a16="http://schemas.microsoft.com/office/drawing/2014/main" val="1222162604"/>
+                  </a:ext>
+                </a:extLst>
+              </a:tr>
+              <a:tr h="0">
+                <a:tc>
+                  <a:txBody>
+                    <a:bodyPr/>
+                    <a:lstStyle/>
+                    <a:p>
+                      <a:r>
+                        <a:rPr lang="de-DE" sz="1200" dirty="0" err="1">
+                          <a:latin typeface="Arial" panose="020B0604020202020204" pitchFamily="34" charset="0"/>
+                          <a:cs typeface="Arial" panose="020B0604020202020204" pitchFamily="34" charset="0"/>
+                        </a:rPr>
+                        <a:t>Ics</a:t>
+                      </a:r>
+                      <a:endParaRPr lang="de-DE" sz="1200" dirty="0">
+                        <a:latin typeface="Arial" panose="020B0604020202020204" pitchFamily="34" charset="0"/>
+                        <a:cs typeface="Arial" panose="020B0604020202020204" pitchFamily="34" charset="0"/>
+                      </a:endParaRPr>
+                    </a:p>
+                  </a:txBody>
+                  <a:tcPr marL="36000" marR="36000" marT="36000" marB="36000"/>
+                </a:tc>
+                <a:tc>
+                  <a:txBody>
+                    <a:bodyPr/>
+                    <a:lstStyle/>
+                    <a:p>
+                      <a:pPr algn="ctr"/>
+                      <a:r>
+                        <a:rPr lang="de-DE" sz="1200" dirty="0">
+                          <a:latin typeface="Arial" panose="020B0604020202020204" pitchFamily="34" charset="0"/>
+                          <a:cs typeface="Arial" panose="020B0604020202020204" pitchFamily="34" charset="0"/>
+                        </a:rPr>
+                        <a:t>3</a:t>
+                      </a:r>
+                    </a:p>
+                  </a:txBody>
+                  <a:tcPr marL="36000" marR="36000" marT="36000" marB="36000"/>
+                </a:tc>
+                <a:tc>
+                  <a:txBody>
+                    <a:bodyPr/>
+                    <a:lstStyle/>
+                    <a:p>
+                      <a:pPr algn="ctr"/>
+                      <a:r>
+                        <a:rPr lang="de-DE" sz="1200" dirty="0">
+                          <a:latin typeface="Arial" panose="020B0604020202020204" pitchFamily="34" charset="0"/>
+                          <a:cs typeface="Arial" panose="020B0604020202020204" pitchFamily="34" charset="0"/>
+                        </a:rPr>
+                        <a:t>1</a:t>
+                      </a:r>
+                    </a:p>
+                  </a:txBody>
+                  <a:tcPr marL="36000" marR="36000" marT="36000" marB="36000"/>
+                </a:tc>
+                <a:tc>
+                  <a:txBody>
+                    <a:bodyPr/>
+                    <a:lstStyle/>
+                    <a:p>
+                      <a:pPr algn="ctr"/>
+                      <a:r>
+                        <a:rPr lang="de-DE" sz="1200" dirty="0">
+                          <a:latin typeface="Arial" panose="020B0604020202020204" pitchFamily="34" charset="0"/>
+                          <a:cs typeface="Arial" panose="020B0604020202020204" pitchFamily="34" charset="0"/>
+                        </a:rPr>
+                        <a:t>1</a:t>
+                      </a:r>
+                    </a:p>
+                  </a:txBody>
+                  <a:tcPr marL="36000" marR="36000" marT="36000" marB="36000"/>
+                </a:tc>
+                <a:extLst>
+                  <a:ext uri="{0D108BD9-81ED-4DB2-BD59-A6C34878D82A}">
+                    <a16:rowId xmlns:a16="http://schemas.microsoft.com/office/drawing/2014/main" val="283667690"/>
+                  </a:ext>
+                </a:extLst>
+              </a:tr>
+            </a:tbl>
+          </a:graphicData>
+        </a:graphic>
+      </p:graphicFrame>
+    </p:spTree>
+    <p:extLst>
+      <p:ext uri="{BB962C8B-B14F-4D97-AF65-F5344CB8AC3E}">
+        <p14:creationId xmlns:p14="http://schemas.microsoft.com/office/powerpoint/2010/main" val="987133223"/>
+      </p:ext>
+    </p:extLst>
+  </p:cSld>
+  <p:clrMapOvr>
+    <a:masterClrMapping/>
+  </p:clrMapOvr>
+</p:sld>
+</file>
+
 <file path=ppt/theme/theme1.xml><?xml version="1.0" encoding="utf-8"?>
 <a:theme xmlns:a="http://schemas.openxmlformats.org/drawingml/2006/main" name="Office">
   <a:themeElements>

</xml_diff>